<commit_message>
section 5 first draft
</commit_message>
<xml_diff>
--- a/tex/old/figures.pptx
+++ b/tex/old/figures.pptx
@@ -11,8 +11,9 @@
     <p:sldId id="262" r:id="rId5"/>
     <p:sldId id="256" r:id="rId6"/>
     <p:sldId id="265" r:id="rId7"/>
-    <p:sldId id="261" r:id="rId8"/>
-    <p:sldId id="257" r:id="rId9"/>
+    <p:sldId id="266" r:id="rId8"/>
+    <p:sldId id="261" r:id="rId9"/>
+    <p:sldId id="257" r:id="rId10"/>
   </p:sldIdLst>
   <p:sldSz cx="10080625" cy="5670550"/>
   <p:notesSz cx="7559675" cy="10691813"/>
@@ -15852,6 +15853,15 @@
                         <a:headEnd type="none" w="med" len="med"/>
                         <a:tailEnd type="none" w="med" len="med"/>
                       </a:lnR>
+                      <a:lnT w="12700" cap="flat" cmpd="sng" algn="ctr">
+                        <a:solidFill>
+                          <a:schemeClr val="tx1"/>
+                        </a:solidFill>
+                        <a:prstDash val="solid"/>
+                        <a:round/>
+                        <a:headEnd type="none" w="med" len="med"/>
+                        <a:tailEnd type="none" w="med" len="med"/>
+                      </a:lnT>
                       <a:lnB w="12700" cap="flat" cmpd="sng" algn="ctr">
                         <a:solidFill>
                           <a:schemeClr val="tx1"/>
@@ -16519,6 +16529,1708 @@
 </file>
 
 <file path=ppt/slides/slide7.xml><?xml version="1.0" encoding="utf-8"?>
+<p:sld xmlns:a="http://schemas.openxmlformats.org/drawingml/2006/main" xmlns:r="http://schemas.openxmlformats.org/officeDocument/2006/relationships" xmlns:p="http://schemas.openxmlformats.org/presentationml/2006/main">
+  <p:cSld>
+    <p:spTree>
+      <p:nvGrpSpPr>
+        <p:cNvPr id="1" name=""/>
+        <p:cNvGrpSpPr/>
+        <p:nvPr/>
+      </p:nvGrpSpPr>
+      <p:grpSpPr>
+        <a:xfrm>
+          <a:off x="0" y="0"/>
+          <a:ext cx="0" cy="0"/>
+          <a:chOff x="0" y="0"/>
+          <a:chExt cx="0" cy="0"/>
+        </a:xfrm>
+      </p:grpSpPr>
+      <p:grpSp>
+        <p:nvGrpSpPr>
+          <p:cNvPr id="36" name="Group 35">
+            <a:extLst>
+              <a:ext uri="{FF2B5EF4-FFF2-40B4-BE49-F238E27FC236}">
+                <a16:creationId xmlns:a16="http://schemas.microsoft.com/office/drawing/2014/main" id="{9B4F6687-FF87-1442-8208-ECCF1D01D52B}"/>
+              </a:ext>
+            </a:extLst>
+          </p:cNvPr>
+          <p:cNvGrpSpPr/>
+          <p:nvPr/>
+        </p:nvGrpSpPr>
+        <p:grpSpPr>
+          <a:xfrm>
+            <a:off x="503808" y="265923"/>
+            <a:ext cx="6521702" cy="2497344"/>
+            <a:chOff x="503808" y="265923"/>
+            <a:chExt cx="6521702" cy="2497344"/>
+          </a:xfrm>
+        </p:grpSpPr>
+        <p:cxnSp>
+          <p:nvCxnSpPr>
+            <p:cNvPr id="20" name="Straight Connector 19">
+              <a:extLst>
+                <a:ext uri="{FF2B5EF4-FFF2-40B4-BE49-F238E27FC236}">
+                  <a16:creationId xmlns:a16="http://schemas.microsoft.com/office/drawing/2014/main" id="{5B192B82-D3B2-02F4-5951-E5B8F56CD249}"/>
+                </a:ext>
+              </a:extLst>
+            </p:cNvPr>
+            <p:cNvCxnSpPr>
+              <a:cxnSpLocks/>
+            </p:cNvCxnSpPr>
+            <p:nvPr/>
+          </p:nvCxnSpPr>
+          <p:spPr>
+            <a:xfrm>
+              <a:off x="3312120" y="1683147"/>
+              <a:ext cx="0" cy="1080120"/>
+            </a:xfrm>
+            <a:prstGeom prst="line">
+              <a:avLst/>
+            </a:prstGeom>
+            <a:ln w="28575">
+              <a:solidFill>
+                <a:schemeClr val="bg1">
+                  <a:lumMod val="75000"/>
+                </a:schemeClr>
+              </a:solidFill>
+              <a:prstDash val="sysDot"/>
+            </a:ln>
+          </p:spPr>
+          <p:style>
+            <a:lnRef idx="1">
+              <a:schemeClr val="accent1"/>
+            </a:lnRef>
+            <a:fillRef idx="0">
+              <a:schemeClr val="accent1"/>
+            </a:fillRef>
+            <a:effectRef idx="0">
+              <a:schemeClr val="accent1"/>
+            </a:effectRef>
+            <a:fontRef idx="minor">
+              <a:schemeClr val="tx1"/>
+            </a:fontRef>
+          </p:style>
+        </p:cxnSp>
+        <p:graphicFrame>
+          <p:nvGraphicFramePr>
+            <p:cNvPr id="7" name="Table 1">
+              <a:extLst>
+                <a:ext uri="{FF2B5EF4-FFF2-40B4-BE49-F238E27FC236}">
+                  <a16:creationId xmlns:a16="http://schemas.microsoft.com/office/drawing/2014/main" id="{957A6723-27B3-6D32-60D7-9375CE442B5E}"/>
+                </a:ext>
+              </a:extLst>
+            </p:cNvPr>
+            <p:cNvGraphicFramePr/>
+            <p:nvPr>
+              <p:extLst>
+                <p:ext uri="{D42A27DB-BD31-4B8C-83A1-F6EECF244321}">
+                  <p14:modId xmlns:p14="http://schemas.microsoft.com/office/powerpoint/2010/main" val="195963615"/>
+                </p:ext>
+              </p:extLst>
+            </p:nvPr>
+          </p:nvGraphicFramePr>
+          <p:xfrm>
+            <a:off x="693508" y="573368"/>
+            <a:ext cx="6029312" cy="1066800"/>
+          </p:xfrm>
+          <a:graphic>
+            <a:graphicData uri="http://schemas.openxmlformats.org/drawingml/2006/table">
+              <a:tbl>
+                <a:tblPr/>
+                <a:tblGrid>
+                  <a:gridCol w="563760">
+                    <a:extLst>
+                      <a:ext uri="{9D8B030D-6E8A-4147-A177-3AD203B41FA5}">
+                        <a16:colId xmlns:a16="http://schemas.microsoft.com/office/drawing/2014/main" val="20000"/>
+                      </a:ext>
+                    </a:extLst>
+                  </a:gridCol>
+                  <a:gridCol w="683194">
+                    <a:extLst>
+                      <a:ext uri="{9D8B030D-6E8A-4147-A177-3AD203B41FA5}">
+                        <a16:colId xmlns:a16="http://schemas.microsoft.com/office/drawing/2014/main" val="20001"/>
+                      </a:ext>
+                    </a:extLst>
+                  </a:gridCol>
+                  <a:gridCol w="1366388">
+                    <a:extLst>
+                      <a:ext uri="{9D8B030D-6E8A-4147-A177-3AD203B41FA5}">
+                        <a16:colId xmlns:a16="http://schemas.microsoft.com/office/drawing/2014/main" val="631010376"/>
+                      </a:ext>
+                    </a:extLst>
+                  </a:gridCol>
+                  <a:gridCol w="725350">
+                    <a:extLst>
+                      <a:ext uri="{9D8B030D-6E8A-4147-A177-3AD203B41FA5}">
+                        <a16:colId xmlns:a16="http://schemas.microsoft.com/office/drawing/2014/main" val="1916309031"/>
+                      </a:ext>
+                    </a:extLst>
+                  </a:gridCol>
+                  <a:gridCol w="641038">
+                    <a:extLst>
+                      <a:ext uri="{9D8B030D-6E8A-4147-A177-3AD203B41FA5}">
+                        <a16:colId xmlns:a16="http://schemas.microsoft.com/office/drawing/2014/main" val="2317427843"/>
+                      </a:ext>
+                    </a:extLst>
+                  </a:gridCol>
+                  <a:gridCol w="1366388">
+                    <a:extLst>
+                      <a:ext uri="{9D8B030D-6E8A-4147-A177-3AD203B41FA5}">
+                        <a16:colId xmlns:a16="http://schemas.microsoft.com/office/drawing/2014/main" val="1950255188"/>
+                      </a:ext>
+                    </a:extLst>
+                  </a:gridCol>
+                  <a:gridCol w="683194">
+                    <a:extLst>
+                      <a:ext uri="{9D8B030D-6E8A-4147-A177-3AD203B41FA5}">
+                        <a16:colId xmlns:a16="http://schemas.microsoft.com/office/drawing/2014/main" val="340497729"/>
+                      </a:ext>
+                    </a:extLst>
+                  </a:gridCol>
+                </a:tblGrid>
+                <a:tr h="191186">
+                  <a:tc>
+                    <a:txBody>
+                      <a:bodyPr/>
+                      <a:lstStyle/>
+                      <a:p>
+                        <a:pPr algn="ctr"/>
+                        <a:endParaRPr lang="en-US" sz="900" b="0" strike="noStrike" spc="-1" dirty="0">
+                          <a:latin typeface="Lucida Sans" panose="020B0602030504020204" pitchFamily="34" charset="0"/>
+                        </a:endParaRPr>
+                      </a:p>
+                      <a:p>
+                        <a:pPr algn="ctr"/>
+                        <a:r>
+                          <a:rPr lang="en-US" sz="1600" b="0" strike="noStrike" spc="-1" dirty="0">
+                            <a:latin typeface="Lucida Sans" panose="020B0602030504020204" pitchFamily="34" charset="0"/>
+                          </a:rPr>
+                          <a:t>x</a:t>
+                        </a:r>
+                        <a:r>
+                          <a:rPr lang="en-US" sz="1600" b="0" strike="noStrike" spc="-1" baseline="-25000" dirty="0">
+                            <a:latin typeface="Lucida Sans" panose="020B0602030504020204" pitchFamily="34" charset="0"/>
+                          </a:rPr>
+                          <a:t>1</a:t>
+                        </a:r>
+                      </a:p>
+                      <a:p>
+                        <a:pPr algn="ctr"/>
+                        <a:endParaRPr lang="en-US" sz="1600" b="0" strike="noStrike" spc="-1" baseline="-25000" dirty="0">
+                          <a:latin typeface="Lucida Sans" panose="020B0602030504020204" pitchFamily="34" charset="0"/>
+                        </a:endParaRPr>
+                      </a:p>
+                    </a:txBody>
+                    <a:tcPr marL="90000" marR="90000">
+                      <a:lnL w="12700" cap="flat" cmpd="sng" algn="ctr">
+                        <a:solidFill>
+                          <a:schemeClr val="tx1"/>
+                        </a:solidFill>
+                        <a:prstDash val="solid"/>
+                        <a:round/>
+                        <a:headEnd type="none" w="med" len="med"/>
+                        <a:tailEnd type="none" w="med" len="med"/>
+                      </a:lnL>
+                      <a:lnR w="12700" cap="flat" cmpd="sng" algn="ctr">
+                        <a:solidFill>
+                          <a:schemeClr val="tx1"/>
+                        </a:solidFill>
+                        <a:prstDash val="solid"/>
+                        <a:round/>
+                        <a:headEnd type="none" w="med" len="med"/>
+                        <a:tailEnd type="none" w="med" len="med"/>
+                      </a:lnR>
+                      <a:lnT w="12700" cap="flat" cmpd="sng" algn="ctr">
+                        <a:solidFill>
+                          <a:schemeClr val="tx1"/>
+                        </a:solidFill>
+                        <a:prstDash val="solid"/>
+                        <a:round/>
+                        <a:headEnd type="none" w="med" len="med"/>
+                        <a:tailEnd type="none" w="med" len="med"/>
+                      </a:lnT>
+                      <a:lnB w="12700" cap="flat" cmpd="sng" algn="ctr">
+                        <a:solidFill>
+                          <a:schemeClr val="tx1"/>
+                        </a:solidFill>
+                        <a:prstDash val="solid"/>
+                        <a:round/>
+                        <a:headEnd type="none" w="med" len="med"/>
+                        <a:tailEnd type="none" w="med" len="med"/>
+                      </a:lnB>
+                      <a:lnTlToBr w="12700" cmpd="sng">
+                        <a:noFill/>
+                        <a:prstDash val="solid"/>
+                      </a:lnTlToBr>
+                      <a:lnBlToTr w="12700" cmpd="sng">
+                        <a:noFill/>
+                        <a:prstDash val="solid"/>
+                      </a:lnBlToTr>
+                      <a:solidFill>
+                        <a:srgbClr val="FFB2B2"/>
+                      </a:solidFill>
+                    </a:tcPr>
+                  </a:tc>
+                  <a:tc>
+                    <a:txBody>
+                      <a:bodyPr/>
+                      <a:lstStyle/>
+                      <a:p>
+                        <a:pPr marL="0" marR="0" lvl="0" indent="0" algn="ctr" defTabSz="914400" rtl="0" eaLnBrk="1" fontAlgn="auto" latinLnBrk="0" hangingPunct="1">
+                          <a:lnSpc>
+                            <a:spcPct val="100000"/>
+                          </a:lnSpc>
+                          <a:spcBef>
+                            <a:spcPts val="0"/>
+                          </a:spcBef>
+                          <a:spcAft>
+                            <a:spcPts val="0"/>
+                          </a:spcAft>
+                          <a:buClrTx/>
+                          <a:buSzTx/>
+                          <a:buFontTx/>
+                          <a:buNone/>
+                          <a:tabLst/>
+                          <a:defRPr/>
+                        </a:pPr>
+                        <a:r>
+                          <a:rPr lang="en-US" sz="1600" dirty="0">
+                            <a:latin typeface="Lucida Sans" panose="020B0602030504020204" pitchFamily="34" charset="0"/>
+                          </a:rPr>
+                          <a:t>0</a:t>
+                        </a:r>
+                      </a:p>
+                      <a:p>
+                        <a:pPr marL="0" marR="0" lvl="0" indent="0" algn="ctr" defTabSz="914400" rtl="0" eaLnBrk="1" fontAlgn="auto" latinLnBrk="0" hangingPunct="1">
+                          <a:lnSpc>
+                            <a:spcPct val="100000"/>
+                          </a:lnSpc>
+                          <a:spcBef>
+                            <a:spcPts val="0"/>
+                          </a:spcBef>
+                          <a:spcAft>
+                            <a:spcPts val="0"/>
+                          </a:spcAft>
+                          <a:buClrTx/>
+                          <a:buSzTx/>
+                          <a:buFontTx/>
+                          <a:buNone/>
+                          <a:tabLst/>
+                          <a:defRPr/>
+                        </a:pPr>
+                        <a:r>
+                          <a:rPr lang="en-US" sz="1600" dirty="0">
+                            <a:latin typeface="Lucida Sans" panose="020B0602030504020204" pitchFamily="34" charset="0"/>
+                          </a:rPr>
+                          <a:t>0</a:t>
+                        </a:r>
+                        <a:r>
+                          <a:rPr lang="en-US" sz="1600" b="0" strike="noStrike" spc="-1" dirty="0">
+                            <a:latin typeface="Lucida Sans" panose="020B0602030504020204" pitchFamily="34" charset="0"/>
+                          </a:rPr>
+                          <a:t>⋅</a:t>
+                        </a:r>
+                        <a:r>
+                          <a:rPr lang="en-US" sz="1600" dirty="0">
+                            <a:latin typeface="Lucida Sans" panose="020B0602030504020204" pitchFamily="34" charset="0"/>
+                          </a:rPr>
+                          <a:t>1</a:t>
+                        </a:r>
+                      </a:p>
+                    </a:txBody>
+                    <a:tcPr marL="90000" marR="90000">
+                      <a:lnL w="12700" cap="flat" cmpd="sng" algn="ctr">
+                        <a:solidFill>
+                          <a:schemeClr val="tx1"/>
+                        </a:solidFill>
+                        <a:prstDash val="solid"/>
+                        <a:round/>
+                        <a:headEnd type="none" w="med" len="med"/>
+                        <a:tailEnd type="none" w="med" len="med"/>
+                      </a:lnL>
+                      <a:lnR w="12700" cap="flat" cmpd="sng" algn="ctr">
+                        <a:solidFill>
+                          <a:schemeClr val="tx1"/>
+                        </a:solidFill>
+                        <a:prstDash val="solid"/>
+                        <a:round/>
+                        <a:headEnd type="none" w="med" len="med"/>
+                        <a:tailEnd type="none" w="med" len="med"/>
+                      </a:lnR>
+                      <a:lnT w="12700" cap="flat" cmpd="sng" algn="ctr">
+                        <a:solidFill>
+                          <a:schemeClr val="tx1"/>
+                        </a:solidFill>
+                        <a:prstDash val="solid"/>
+                        <a:round/>
+                        <a:headEnd type="none" w="med" len="med"/>
+                        <a:tailEnd type="none" w="med" len="med"/>
+                      </a:lnT>
+                      <a:lnB w="12700" cap="flat" cmpd="sng" algn="ctr">
+                        <a:solidFill>
+                          <a:schemeClr val="tx1"/>
+                        </a:solidFill>
+                        <a:prstDash val="solid"/>
+                        <a:round/>
+                        <a:headEnd type="none" w="med" len="med"/>
+                        <a:tailEnd type="none" w="med" len="med"/>
+                      </a:lnB>
+                      <a:lnTlToBr w="12700" cmpd="sng">
+                        <a:noFill/>
+                        <a:prstDash val="solid"/>
+                      </a:lnTlToBr>
+                      <a:lnBlToTr w="12700" cmpd="sng">
+                        <a:noFill/>
+                        <a:prstDash val="solid"/>
+                      </a:lnBlToTr>
+                      <a:solidFill>
+                        <a:srgbClr val="FFB2B2"/>
+                      </a:solidFill>
+                    </a:tcPr>
+                  </a:tc>
+                  <a:tc>
+                    <a:txBody>
+                      <a:bodyPr/>
+                      <a:lstStyle/>
+                      <a:p>
+                        <a:pPr marL="0" marR="0" lvl="0" indent="0" algn="ctr" defTabSz="914400" rtl="0" eaLnBrk="1" fontAlgn="auto" latinLnBrk="0" hangingPunct="1">
+                          <a:lnSpc>
+                            <a:spcPct val="100000"/>
+                          </a:lnSpc>
+                          <a:spcBef>
+                            <a:spcPts val="0"/>
+                          </a:spcBef>
+                          <a:spcAft>
+                            <a:spcPts val="0"/>
+                          </a:spcAft>
+                          <a:buClrTx/>
+                          <a:buSzTx/>
+                          <a:buFontTx/>
+                          <a:buNone/>
+                          <a:tabLst/>
+                          <a:defRPr/>
+                        </a:pPr>
+                        <a:r>
+                          <a:rPr lang="en-US" sz="1600" dirty="0">
+                            <a:latin typeface="Lucida Sans" panose="020B0602030504020204" pitchFamily="34" charset="0"/>
+                          </a:rPr>
+                          <a:t>0</a:t>
+                        </a:r>
+                      </a:p>
+                      <a:p>
+                        <a:pPr marL="0" marR="0" lvl="0" indent="0" algn="ctr" defTabSz="914400" rtl="0" eaLnBrk="1" fontAlgn="auto" latinLnBrk="0" hangingPunct="1">
+                          <a:lnSpc>
+                            <a:spcPct val="100000"/>
+                          </a:lnSpc>
+                          <a:spcBef>
+                            <a:spcPts val="0"/>
+                          </a:spcBef>
+                          <a:spcAft>
+                            <a:spcPts val="0"/>
+                          </a:spcAft>
+                          <a:buClrTx/>
+                          <a:buSzTx/>
+                          <a:buFontTx/>
+                          <a:buNone/>
+                          <a:tabLst/>
+                          <a:defRPr/>
+                        </a:pPr>
+                        <a:r>
+                          <a:rPr lang="en-US" sz="1600" dirty="0">
+                            <a:latin typeface="Lucida Sans" panose="020B0602030504020204" pitchFamily="34" charset="0"/>
+                          </a:rPr>
+                          <a:t>0</a:t>
+                        </a:r>
+                        <a:r>
+                          <a:rPr lang="en-US" sz="1600" b="0" strike="noStrike" spc="-1" dirty="0">
+                            <a:latin typeface="Lucida Sans" panose="020B0602030504020204" pitchFamily="34" charset="0"/>
+                          </a:rPr>
+                          <a:t>⋅</a:t>
+                        </a:r>
+                        <a:r>
+                          <a:rPr lang="en-US" sz="1600" dirty="0">
+                            <a:latin typeface="Lucida Sans" panose="020B0602030504020204" pitchFamily="34" charset="0"/>
+                          </a:rPr>
+                          <a:t>1</a:t>
+                        </a:r>
+                      </a:p>
+                      <a:p>
+                        <a:pPr marL="0" marR="0" lvl="0" indent="0" algn="ctr" defTabSz="914400" rtl="0" eaLnBrk="1" fontAlgn="auto" latinLnBrk="0" hangingPunct="1">
+                          <a:lnSpc>
+                            <a:spcPct val="100000"/>
+                          </a:lnSpc>
+                          <a:spcBef>
+                            <a:spcPts val="0"/>
+                          </a:spcBef>
+                          <a:spcAft>
+                            <a:spcPts val="0"/>
+                          </a:spcAft>
+                          <a:buClrTx/>
+                          <a:buSzTx/>
+                          <a:buFontTx/>
+                          <a:buNone/>
+                          <a:tabLst/>
+                          <a:defRPr/>
+                        </a:pPr>
+                        <a:r>
+                          <a:rPr lang="en-US" sz="1600" dirty="0">
+                            <a:latin typeface="Lucida Sans" panose="020B0602030504020204" pitchFamily="34" charset="0"/>
+                          </a:rPr>
+                          <a:t>1</a:t>
+                        </a:r>
+                      </a:p>
+                    </a:txBody>
+                    <a:tcPr marL="90000" marR="90000">
+                      <a:lnL w="12700" cap="flat" cmpd="sng" algn="ctr">
+                        <a:solidFill>
+                          <a:schemeClr val="tx1"/>
+                        </a:solidFill>
+                        <a:prstDash val="solid"/>
+                        <a:round/>
+                        <a:headEnd type="none" w="med" len="med"/>
+                        <a:tailEnd type="none" w="med" len="med"/>
+                      </a:lnL>
+                      <a:lnR w="12700" cap="flat" cmpd="sng" algn="ctr">
+                        <a:solidFill>
+                          <a:schemeClr val="tx1"/>
+                        </a:solidFill>
+                        <a:prstDash val="solid"/>
+                        <a:round/>
+                        <a:headEnd type="none" w="med" len="med"/>
+                        <a:tailEnd type="none" w="med" len="med"/>
+                      </a:lnR>
+                      <a:lnT w="12700" cap="flat" cmpd="sng" algn="ctr">
+                        <a:solidFill>
+                          <a:schemeClr val="tx1"/>
+                        </a:solidFill>
+                        <a:prstDash val="solid"/>
+                        <a:round/>
+                        <a:headEnd type="none" w="med" len="med"/>
+                        <a:tailEnd type="none" w="med" len="med"/>
+                      </a:lnT>
+                      <a:lnB w="12700" cap="flat" cmpd="sng" algn="ctr">
+                        <a:solidFill>
+                          <a:schemeClr val="tx1"/>
+                        </a:solidFill>
+                        <a:prstDash val="solid"/>
+                        <a:round/>
+                        <a:headEnd type="none" w="med" len="med"/>
+                        <a:tailEnd type="none" w="med" len="med"/>
+                      </a:lnB>
+                      <a:lnTlToBr w="12700" cmpd="sng">
+                        <a:noFill/>
+                        <a:prstDash val="solid"/>
+                      </a:lnTlToBr>
+                      <a:lnBlToTr w="12700" cmpd="sng">
+                        <a:noFill/>
+                        <a:prstDash val="solid"/>
+                      </a:lnBlToTr>
+                      <a:solidFill>
+                        <a:srgbClr val="FFB2B2"/>
+                      </a:solidFill>
+                    </a:tcPr>
+                  </a:tc>
+                  <a:tc>
+                    <a:txBody>
+                      <a:bodyPr/>
+                      <a:lstStyle/>
+                      <a:p>
+                        <a:pPr marL="0" marR="0" lvl="0" indent="0" algn="ctr" defTabSz="914400" rtl="0" eaLnBrk="1" fontAlgn="auto" latinLnBrk="0" hangingPunct="1">
+                          <a:lnSpc>
+                            <a:spcPct val="100000"/>
+                          </a:lnSpc>
+                          <a:spcBef>
+                            <a:spcPts val="0"/>
+                          </a:spcBef>
+                          <a:spcAft>
+                            <a:spcPts val="0"/>
+                          </a:spcAft>
+                          <a:buClrTx/>
+                          <a:buSzTx/>
+                          <a:buFontTx/>
+                          <a:buNone/>
+                          <a:tabLst/>
+                          <a:defRPr/>
+                        </a:pPr>
+                        <a:r>
+                          <a:rPr lang="en-US" sz="1600" dirty="0">
+                            <a:latin typeface="Lucida Sans" panose="020B0602030504020204" pitchFamily="34" charset="0"/>
+                          </a:rPr>
+                          <a:t>0</a:t>
+                        </a:r>
+                        <a:r>
+                          <a:rPr lang="en-US" sz="1600" b="0" strike="noStrike" spc="-1" dirty="0">
+                            <a:latin typeface="Lucida Sans" panose="020B0602030504020204" pitchFamily="34" charset="0"/>
+                          </a:rPr>
+                          <a:t>⋅</a:t>
+                        </a:r>
+                        <a:r>
+                          <a:rPr lang="en-US" sz="1600" dirty="0">
+                            <a:latin typeface="Lucida Sans" panose="020B0602030504020204" pitchFamily="34" charset="0"/>
+                          </a:rPr>
+                          <a:t>1</a:t>
+                        </a:r>
+                      </a:p>
+                      <a:p>
+                        <a:pPr marL="0" marR="0" lvl="0" indent="0" algn="ctr" defTabSz="914400" rtl="0" eaLnBrk="1" fontAlgn="auto" latinLnBrk="0" hangingPunct="1">
+                          <a:lnSpc>
+                            <a:spcPct val="100000"/>
+                          </a:lnSpc>
+                          <a:spcBef>
+                            <a:spcPts val="0"/>
+                          </a:spcBef>
+                          <a:spcAft>
+                            <a:spcPts val="0"/>
+                          </a:spcAft>
+                          <a:buClrTx/>
+                          <a:buSzTx/>
+                          <a:buFontTx/>
+                          <a:buNone/>
+                          <a:tabLst/>
+                          <a:defRPr/>
+                        </a:pPr>
+                        <a:r>
+                          <a:rPr lang="en-US" sz="1600" dirty="0">
+                            <a:latin typeface="Lucida Sans" panose="020B0602030504020204" pitchFamily="34" charset="0"/>
+                          </a:rPr>
+                          <a:t>0</a:t>
+                        </a:r>
+                        <a:r>
+                          <a:rPr lang="en-US" sz="1600" b="0" strike="noStrike" spc="-1" dirty="0">
+                            <a:latin typeface="Lucida Sans" panose="020B0602030504020204" pitchFamily="34" charset="0"/>
+                          </a:rPr>
+                          <a:t>⋅</a:t>
+                        </a:r>
+                        <a:r>
+                          <a:rPr lang="en-US" sz="1600" dirty="0">
+                            <a:latin typeface="Lucida Sans" panose="020B0602030504020204" pitchFamily="34" charset="0"/>
+                          </a:rPr>
+                          <a:t>1</a:t>
+                        </a:r>
+                        <a:r>
+                          <a:rPr lang="en-US" sz="1600" b="0" strike="noStrike" spc="-1" dirty="0">
+                            <a:latin typeface="Lucida Sans" panose="020B0602030504020204" pitchFamily="34" charset="0"/>
+                          </a:rPr>
+                          <a:t>⋅</a:t>
+                        </a:r>
+                        <a:r>
+                          <a:rPr lang="en-US" sz="1600" dirty="0">
+                            <a:latin typeface="Lucida Sans" panose="020B0602030504020204" pitchFamily="34" charset="0"/>
+                          </a:rPr>
+                          <a:t>0</a:t>
+                        </a:r>
+                      </a:p>
+                      <a:p>
+                        <a:pPr marL="0" marR="0" lvl="0" indent="0" algn="ctr" defTabSz="914400" rtl="0" eaLnBrk="1" fontAlgn="auto" latinLnBrk="0" hangingPunct="1">
+                          <a:lnSpc>
+                            <a:spcPct val="100000"/>
+                          </a:lnSpc>
+                          <a:spcBef>
+                            <a:spcPts val="0"/>
+                          </a:spcBef>
+                          <a:spcAft>
+                            <a:spcPts val="0"/>
+                          </a:spcAft>
+                          <a:buClrTx/>
+                          <a:buSzTx/>
+                          <a:buFontTx/>
+                          <a:buNone/>
+                          <a:tabLst/>
+                          <a:defRPr/>
+                        </a:pPr>
+                        <a:r>
+                          <a:rPr lang="en-US" sz="1600" dirty="0">
+                            <a:latin typeface="Lucida Sans" panose="020B0602030504020204" pitchFamily="34" charset="0"/>
+                          </a:rPr>
+                          <a:t>1</a:t>
+                        </a:r>
+                      </a:p>
+                      <a:p>
+                        <a:pPr marL="0" marR="0" lvl="0" indent="0" algn="ctr" defTabSz="914400" rtl="0" eaLnBrk="1" fontAlgn="auto" latinLnBrk="0" hangingPunct="1">
+                          <a:lnSpc>
+                            <a:spcPct val="100000"/>
+                          </a:lnSpc>
+                          <a:spcBef>
+                            <a:spcPts val="0"/>
+                          </a:spcBef>
+                          <a:spcAft>
+                            <a:spcPts val="0"/>
+                          </a:spcAft>
+                          <a:buClrTx/>
+                          <a:buSzTx/>
+                          <a:buFontTx/>
+                          <a:buNone/>
+                          <a:tabLst/>
+                          <a:defRPr/>
+                        </a:pPr>
+                        <a:r>
+                          <a:rPr lang="en-US" sz="1600" dirty="0">
+                            <a:latin typeface="Lucida Sans" panose="020B0602030504020204" pitchFamily="34" charset="0"/>
+                          </a:rPr>
+                          <a:t>1</a:t>
+                        </a:r>
+                        <a:r>
+                          <a:rPr lang="en-US" sz="1600" b="0" strike="noStrike" spc="-1" dirty="0">
+                            <a:latin typeface="Lucida Sans" panose="020B0602030504020204" pitchFamily="34" charset="0"/>
+                          </a:rPr>
+                          <a:t>⋅</a:t>
+                        </a:r>
+                        <a:r>
+                          <a:rPr lang="en-US" sz="1600" dirty="0">
+                            <a:latin typeface="Lucida Sans" panose="020B0602030504020204" pitchFamily="34" charset="0"/>
+                          </a:rPr>
+                          <a:t>0</a:t>
+                        </a:r>
+                      </a:p>
+                    </a:txBody>
+                    <a:tcPr marL="90000" marR="90000">
+                      <a:lnL w="12700" cap="flat" cmpd="sng" algn="ctr">
+                        <a:solidFill>
+                          <a:schemeClr val="tx1"/>
+                        </a:solidFill>
+                        <a:prstDash val="solid"/>
+                        <a:round/>
+                        <a:headEnd type="none" w="med" len="med"/>
+                        <a:tailEnd type="none" w="med" len="med"/>
+                      </a:lnL>
+                      <a:lnR w="12700" cap="flat" cmpd="sng" algn="ctr">
+                        <a:solidFill>
+                          <a:schemeClr val="tx1"/>
+                        </a:solidFill>
+                        <a:prstDash val="solid"/>
+                        <a:round/>
+                        <a:headEnd type="none" w="med" len="med"/>
+                        <a:tailEnd type="none" w="med" len="med"/>
+                      </a:lnR>
+                      <a:lnT w="12700" cap="flat" cmpd="sng" algn="ctr">
+                        <a:solidFill>
+                          <a:schemeClr val="tx1"/>
+                        </a:solidFill>
+                        <a:prstDash val="solid"/>
+                        <a:round/>
+                        <a:headEnd type="none" w="med" len="med"/>
+                        <a:tailEnd type="none" w="med" len="med"/>
+                      </a:lnT>
+                      <a:lnB w="12700" cap="flat" cmpd="sng" algn="ctr">
+                        <a:solidFill>
+                          <a:schemeClr val="tx1"/>
+                        </a:solidFill>
+                        <a:prstDash val="solid"/>
+                        <a:round/>
+                        <a:headEnd type="none" w="med" len="med"/>
+                        <a:tailEnd type="none" w="med" len="med"/>
+                      </a:lnB>
+                      <a:lnTlToBr w="12700" cmpd="sng">
+                        <a:noFill/>
+                        <a:prstDash val="solid"/>
+                      </a:lnTlToBr>
+                      <a:lnBlToTr w="12700" cmpd="sng">
+                        <a:noFill/>
+                        <a:prstDash val="solid"/>
+                      </a:lnBlToTr>
+                      <a:solidFill>
+                        <a:srgbClr val="FFB2B2"/>
+                      </a:solidFill>
+                    </a:tcPr>
+                  </a:tc>
+                  <a:tc>
+                    <a:txBody>
+                      <a:bodyPr/>
+                      <a:lstStyle/>
+                      <a:p>
+                        <a:pPr marL="0" marR="0" lvl="0" indent="0" algn="ctr" defTabSz="914400" rtl="0" eaLnBrk="1" fontAlgn="auto" latinLnBrk="0" hangingPunct="1">
+                          <a:lnSpc>
+                            <a:spcPct val="100000"/>
+                          </a:lnSpc>
+                          <a:spcBef>
+                            <a:spcPts val="0"/>
+                          </a:spcBef>
+                          <a:spcAft>
+                            <a:spcPts val="0"/>
+                          </a:spcAft>
+                          <a:buClrTx/>
+                          <a:buSzTx/>
+                          <a:buFontTx/>
+                          <a:buNone/>
+                          <a:tabLst/>
+                          <a:defRPr/>
+                        </a:pPr>
+                        <a:r>
+                          <a:rPr lang="en-US" sz="1600" dirty="0">
+                            <a:latin typeface="Lucida Sans" panose="020B0602030504020204" pitchFamily="34" charset="0"/>
+                          </a:rPr>
+                          <a:t>1</a:t>
+                        </a:r>
+                      </a:p>
+                      <a:p>
+                        <a:pPr marL="0" marR="0" lvl="0" indent="0" algn="ctr" defTabSz="914400" rtl="0" eaLnBrk="1" fontAlgn="auto" latinLnBrk="0" hangingPunct="1">
+                          <a:lnSpc>
+                            <a:spcPct val="100000"/>
+                          </a:lnSpc>
+                          <a:spcBef>
+                            <a:spcPts val="0"/>
+                          </a:spcBef>
+                          <a:spcAft>
+                            <a:spcPts val="0"/>
+                          </a:spcAft>
+                          <a:buClrTx/>
+                          <a:buSzTx/>
+                          <a:buFontTx/>
+                          <a:buNone/>
+                          <a:tabLst/>
+                          <a:defRPr/>
+                        </a:pPr>
+                        <a:r>
+                          <a:rPr lang="en-US" sz="1600" dirty="0">
+                            <a:latin typeface="Lucida Sans" panose="020B0602030504020204" pitchFamily="34" charset="0"/>
+                          </a:rPr>
+                          <a:t>1</a:t>
+                        </a:r>
+                        <a:r>
+                          <a:rPr lang="en-US" sz="1600" b="0" strike="noStrike" spc="-1" dirty="0">
+                            <a:latin typeface="Lucida Sans" panose="020B0602030504020204" pitchFamily="34" charset="0"/>
+                          </a:rPr>
+                          <a:t>⋅</a:t>
+                        </a:r>
+                        <a:r>
+                          <a:rPr lang="en-US" sz="1600" dirty="0">
+                            <a:latin typeface="Lucida Sans" panose="020B0602030504020204" pitchFamily="34" charset="0"/>
+                          </a:rPr>
+                          <a:t>0</a:t>
+                        </a:r>
+                      </a:p>
+                      <a:p>
+                        <a:pPr marL="0" marR="0" lvl="0" indent="0" algn="ctr" defTabSz="914400" rtl="0" eaLnBrk="1" fontAlgn="auto" latinLnBrk="0" hangingPunct="1">
+                          <a:lnSpc>
+                            <a:spcPct val="100000"/>
+                          </a:lnSpc>
+                          <a:spcBef>
+                            <a:spcPts val="0"/>
+                          </a:spcBef>
+                          <a:spcAft>
+                            <a:spcPts val="0"/>
+                          </a:spcAft>
+                          <a:buClrTx/>
+                          <a:buSzTx/>
+                          <a:buFontTx/>
+                          <a:buNone/>
+                          <a:tabLst/>
+                          <a:defRPr/>
+                        </a:pPr>
+                        <a:r>
+                          <a:rPr lang="en-US" sz="1600" dirty="0">
+                            <a:latin typeface="Lucida Sans" panose="020B0602030504020204" pitchFamily="34" charset="0"/>
+                          </a:rPr>
+                          <a:t>0</a:t>
+                        </a:r>
+                      </a:p>
+                    </a:txBody>
+                    <a:tcPr marL="90000" marR="90000">
+                      <a:lnL w="12700" cap="flat" cmpd="sng" algn="ctr">
+                        <a:solidFill>
+                          <a:schemeClr val="tx1"/>
+                        </a:solidFill>
+                        <a:prstDash val="solid"/>
+                        <a:round/>
+                        <a:headEnd type="none" w="med" len="med"/>
+                        <a:tailEnd type="none" w="med" len="med"/>
+                      </a:lnL>
+                      <a:lnR w="12700" cap="flat" cmpd="sng" algn="ctr">
+                        <a:solidFill>
+                          <a:schemeClr val="tx1"/>
+                        </a:solidFill>
+                        <a:prstDash val="solid"/>
+                        <a:round/>
+                        <a:headEnd type="none" w="med" len="med"/>
+                        <a:tailEnd type="none" w="med" len="med"/>
+                      </a:lnR>
+                      <a:lnT w="12700" cap="flat" cmpd="sng" algn="ctr">
+                        <a:solidFill>
+                          <a:schemeClr val="tx1"/>
+                        </a:solidFill>
+                        <a:prstDash val="solid"/>
+                        <a:round/>
+                        <a:headEnd type="none" w="med" len="med"/>
+                        <a:tailEnd type="none" w="med" len="med"/>
+                      </a:lnT>
+                      <a:lnB w="12700" cap="flat" cmpd="sng" algn="ctr">
+                        <a:solidFill>
+                          <a:schemeClr val="tx1"/>
+                        </a:solidFill>
+                        <a:prstDash val="solid"/>
+                        <a:round/>
+                        <a:headEnd type="none" w="med" len="med"/>
+                        <a:tailEnd type="none" w="med" len="med"/>
+                      </a:lnB>
+                      <a:lnTlToBr w="12700" cmpd="sng">
+                        <a:noFill/>
+                        <a:prstDash val="solid"/>
+                      </a:lnTlToBr>
+                      <a:lnBlToTr w="12700" cmpd="sng">
+                        <a:noFill/>
+                        <a:prstDash val="solid"/>
+                      </a:lnBlToTr>
+                      <a:solidFill>
+                        <a:srgbClr val="FFB2B2"/>
+                      </a:solidFill>
+                    </a:tcPr>
+                  </a:tc>
+                  <a:tc>
+                    <a:txBody>
+                      <a:bodyPr/>
+                      <a:lstStyle/>
+                      <a:p>
+                        <a:pPr marL="0" marR="0" lvl="0" indent="0" algn="ctr" defTabSz="914400" rtl="0" eaLnBrk="1" fontAlgn="auto" latinLnBrk="0" hangingPunct="1">
+                          <a:lnSpc>
+                            <a:spcPct val="100000"/>
+                          </a:lnSpc>
+                          <a:spcBef>
+                            <a:spcPts val="0"/>
+                          </a:spcBef>
+                          <a:spcAft>
+                            <a:spcPts val="0"/>
+                          </a:spcAft>
+                          <a:buClrTx/>
+                          <a:buSzTx/>
+                          <a:buFontTx/>
+                          <a:buNone/>
+                          <a:tabLst/>
+                          <a:defRPr/>
+                        </a:pPr>
+                        <a:r>
+                          <a:rPr lang="en-US" sz="1600" dirty="0">
+                            <a:latin typeface="Lucida Sans" panose="020B0602030504020204" pitchFamily="34" charset="0"/>
+                          </a:rPr>
+                          <a:t>1</a:t>
+                        </a:r>
+                        <a:r>
+                          <a:rPr lang="en-US" sz="1600" b="0" strike="noStrike" spc="-1" dirty="0">
+                            <a:latin typeface="Lucida Sans" panose="020B0602030504020204" pitchFamily="34" charset="0"/>
+                          </a:rPr>
+                          <a:t>⋅</a:t>
+                        </a:r>
+                        <a:r>
+                          <a:rPr lang="en-US" sz="1600" dirty="0">
+                            <a:latin typeface="Lucida Sans" panose="020B0602030504020204" pitchFamily="34" charset="0"/>
+                          </a:rPr>
+                          <a:t>0</a:t>
+                        </a:r>
+                      </a:p>
+                      <a:p>
+                        <a:pPr marL="0" marR="0" lvl="0" indent="0" algn="ctr" defTabSz="914400" rtl="0" eaLnBrk="1" fontAlgn="auto" latinLnBrk="0" hangingPunct="1">
+                          <a:lnSpc>
+                            <a:spcPct val="100000"/>
+                          </a:lnSpc>
+                          <a:spcBef>
+                            <a:spcPts val="0"/>
+                          </a:spcBef>
+                          <a:spcAft>
+                            <a:spcPts val="0"/>
+                          </a:spcAft>
+                          <a:buClrTx/>
+                          <a:buSzTx/>
+                          <a:buFontTx/>
+                          <a:buNone/>
+                          <a:tabLst/>
+                          <a:defRPr/>
+                        </a:pPr>
+                        <a:r>
+                          <a:rPr lang="en-US" sz="1600" dirty="0">
+                            <a:latin typeface="Lucida Sans" panose="020B0602030504020204" pitchFamily="34" charset="0"/>
+                          </a:rPr>
+                          <a:t>0</a:t>
+                        </a:r>
+                      </a:p>
+                    </a:txBody>
+                    <a:tcPr marL="90000" marR="90000">
+                      <a:lnL w="12700" cap="flat" cmpd="sng" algn="ctr">
+                        <a:solidFill>
+                          <a:schemeClr val="tx1"/>
+                        </a:solidFill>
+                        <a:prstDash val="solid"/>
+                        <a:round/>
+                        <a:headEnd type="none" w="med" len="med"/>
+                        <a:tailEnd type="none" w="med" len="med"/>
+                      </a:lnL>
+                      <a:lnR w="12700" cap="flat" cmpd="sng" algn="ctr">
+                        <a:solidFill>
+                          <a:schemeClr val="tx1"/>
+                        </a:solidFill>
+                        <a:prstDash val="solid"/>
+                        <a:round/>
+                        <a:headEnd type="none" w="med" len="med"/>
+                        <a:tailEnd type="none" w="med" len="med"/>
+                      </a:lnR>
+                      <a:lnT w="12700" cap="flat" cmpd="sng" algn="ctr">
+                        <a:solidFill>
+                          <a:schemeClr val="tx1"/>
+                        </a:solidFill>
+                        <a:prstDash val="solid"/>
+                        <a:round/>
+                        <a:headEnd type="none" w="med" len="med"/>
+                        <a:tailEnd type="none" w="med" len="med"/>
+                      </a:lnT>
+                      <a:lnB w="12700" cap="flat" cmpd="sng" algn="ctr">
+                        <a:solidFill>
+                          <a:schemeClr val="tx1"/>
+                        </a:solidFill>
+                        <a:prstDash val="solid"/>
+                        <a:round/>
+                        <a:headEnd type="none" w="med" len="med"/>
+                        <a:tailEnd type="none" w="med" len="med"/>
+                      </a:lnB>
+                      <a:lnTlToBr w="12700" cmpd="sng">
+                        <a:noFill/>
+                        <a:prstDash val="solid"/>
+                      </a:lnTlToBr>
+                      <a:lnBlToTr w="12700" cmpd="sng">
+                        <a:noFill/>
+                        <a:prstDash val="solid"/>
+                      </a:lnBlToTr>
+                      <a:solidFill>
+                        <a:srgbClr val="FFB2B2"/>
+                      </a:solidFill>
+                    </a:tcPr>
+                  </a:tc>
+                  <a:tc>
+                    <a:txBody>
+                      <a:bodyPr/>
+                      <a:lstStyle/>
+                      <a:p>
+                        <a:pPr marL="0" marR="0" lvl="0" indent="0" algn="ctr" defTabSz="914400" rtl="0" eaLnBrk="1" fontAlgn="auto" latinLnBrk="0" hangingPunct="1">
+                          <a:lnSpc>
+                            <a:spcPct val="100000"/>
+                          </a:lnSpc>
+                          <a:spcBef>
+                            <a:spcPts val="0"/>
+                          </a:spcBef>
+                          <a:spcAft>
+                            <a:spcPts val="0"/>
+                          </a:spcAft>
+                          <a:buClrTx/>
+                          <a:buSzTx/>
+                          <a:buFontTx/>
+                          <a:buNone/>
+                          <a:tabLst/>
+                          <a:defRPr/>
+                        </a:pPr>
+                        <a:r>
+                          <a:rPr lang="en-US" sz="1600" dirty="0">
+                            <a:latin typeface="Lucida Sans" panose="020B0602030504020204" pitchFamily="34" charset="0"/>
+                          </a:rPr>
+                          <a:t>0</a:t>
+                        </a:r>
+                      </a:p>
+                    </a:txBody>
+                    <a:tcPr marL="90000" marR="90000">
+                      <a:lnL w="12700" cap="flat" cmpd="sng" algn="ctr">
+                        <a:solidFill>
+                          <a:schemeClr val="tx1"/>
+                        </a:solidFill>
+                        <a:prstDash val="solid"/>
+                        <a:round/>
+                        <a:headEnd type="none" w="med" len="med"/>
+                        <a:tailEnd type="none" w="med" len="med"/>
+                      </a:lnL>
+                      <a:lnR w="12700" cap="flat" cmpd="sng" algn="ctr">
+                        <a:solidFill>
+                          <a:schemeClr val="tx1"/>
+                        </a:solidFill>
+                        <a:prstDash val="solid"/>
+                        <a:round/>
+                        <a:headEnd type="none" w="med" len="med"/>
+                        <a:tailEnd type="none" w="med" len="med"/>
+                      </a:lnR>
+                      <a:lnT w="12700" cap="flat" cmpd="sng" algn="ctr">
+                        <a:solidFill>
+                          <a:schemeClr val="tx1"/>
+                        </a:solidFill>
+                        <a:prstDash val="solid"/>
+                        <a:round/>
+                        <a:headEnd type="none" w="med" len="med"/>
+                        <a:tailEnd type="none" w="med" len="med"/>
+                      </a:lnT>
+                      <a:lnB w="12700" cap="flat" cmpd="sng" algn="ctr">
+                        <a:solidFill>
+                          <a:schemeClr val="tx1"/>
+                        </a:solidFill>
+                        <a:prstDash val="solid"/>
+                        <a:round/>
+                        <a:headEnd type="none" w="med" len="med"/>
+                        <a:tailEnd type="none" w="med" len="med"/>
+                      </a:lnB>
+                      <a:lnTlToBr w="12700" cmpd="sng">
+                        <a:noFill/>
+                        <a:prstDash val="solid"/>
+                      </a:lnTlToBr>
+                      <a:lnBlToTr w="12700" cmpd="sng">
+                        <a:noFill/>
+                        <a:prstDash val="solid"/>
+                      </a:lnBlToTr>
+                      <a:solidFill>
+                        <a:srgbClr val="FFB2B2"/>
+                      </a:solidFill>
+                    </a:tcPr>
+                  </a:tc>
+                  <a:extLst>
+                    <a:ext uri="{0D108BD9-81ED-4DB2-BD59-A6C34878D82A}">
+                      <a16:rowId xmlns:a16="http://schemas.microsoft.com/office/drawing/2014/main" val="10000"/>
+                    </a:ext>
+                  </a:extLst>
+                </a:tr>
+              </a:tbl>
+            </a:graphicData>
+          </a:graphic>
+        </p:graphicFrame>
+        <p:sp>
+          <p:nvSpPr>
+            <p:cNvPr id="16" name="TextShape 3">
+              <a:extLst>
+                <a:ext uri="{FF2B5EF4-FFF2-40B4-BE49-F238E27FC236}">
+                  <a16:creationId xmlns:a16="http://schemas.microsoft.com/office/drawing/2014/main" id="{A0F123BD-333F-B290-E0A9-6C4A9AFE3659}"/>
+                </a:ext>
+              </a:extLst>
+            </p:cNvPr>
+            <p:cNvSpPr txBox="1"/>
+            <p:nvPr/>
+          </p:nvSpPr>
+          <p:spPr>
+            <a:xfrm>
+              <a:off x="503808" y="265923"/>
+              <a:ext cx="6521702" cy="229769"/>
+            </a:xfrm>
+            <a:prstGeom prst="rect">
+              <a:avLst/>
+            </a:prstGeom>
+            <a:noFill/>
+            <a:ln>
+              <a:noFill/>
+            </a:ln>
+          </p:spPr>
+          <p:txBody>
+            <a:bodyPr lIns="90000" tIns="45000" rIns="90000" bIns="45000"/>
+            <a:lstStyle/>
+            <a:p>
+              <a:r>
+                <a:rPr lang="en-US" sz="1400" b="0" strike="noStrike" spc="-1" dirty="0">
+                  <a:latin typeface="Lucida Sans" panose="020B0602030504020204" pitchFamily="34" charset="0"/>
+                </a:rPr>
+                <a:t>     t</a:t>
+              </a:r>
+              <a:r>
+                <a:rPr lang="tr-TR" sz="1400" b="0" strike="noStrike" spc="-1" dirty="0">
+                  <a:latin typeface="Lucida Sans" panose="020B0602030504020204" pitchFamily="34" charset="0"/>
+                </a:rPr>
+                <a:t> </a:t>
+              </a:r>
+              <a:r>
+                <a:rPr lang="en-US" sz="1400" spc="-1" dirty="0">
+                  <a:latin typeface="Lucida Sans" panose="020B0602030504020204" pitchFamily="34" charset="0"/>
+                </a:rPr>
+                <a:t>:</a:t>
+              </a:r>
+              <a:r>
+                <a:rPr lang="tr-TR" sz="1400" b="0" strike="noStrike" spc="-1" dirty="0">
+                  <a:latin typeface="Lucida Sans" panose="020B0602030504020204" pitchFamily="34" charset="0"/>
+                </a:rPr>
+                <a:t>   0          </a:t>
+              </a:r>
+              <a:r>
+                <a:rPr lang="en-US" sz="1400" b="0" strike="noStrike" spc="-1" dirty="0">
+                  <a:latin typeface="Lucida Sans" panose="020B0602030504020204" pitchFamily="34" charset="0"/>
+                </a:rPr>
+                <a:t> </a:t>
+              </a:r>
+              <a:r>
+                <a:rPr lang="tr-TR" sz="1400" b="0" strike="noStrike" spc="-1" dirty="0">
+                  <a:latin typeface="Lucida Sans" panose="020B0602030504020204" pitchFamily="34" charset="0"/>
+                </a:rPr>
+                <a:t>1          </a:t>
+              </a:r>
+              <a:r>
+                <a:rPr lang="en-US" sz="1400" spc="-1" dirty="0">
+                  <a:latin typeface="Lucida Sans" panose="020B0602030504020204" pitchFamily="34" charset="0"/>
+                </a:rPr>
+                <a:t>   </a:t>
+              </a:r>
+              <a:r>
+                <a:rPr lang="tr-TR" sz="1400" b="0" strike="noStrike" spc="-1" dirty="0">
+                  <a:latin typeface="Lucida Sans" panose="020B0602030504020204" pitchFamily="34" charset="0"/>
+                </a:rPr>
+                <a:t>         3          4</a:t>
+              </a:r>
+              <a:r>
+                <a:rPr lang="en-US" sz="1400" b="0" strike="noStrike" spc="-1" dirty="0">
+                  <a:latin typeface="Lucida Sans" panose="020B0602030504020204" pitchFamily="34" charset="0"/>
+                </a:rPr>
+                <a:t>           5</a:t>
+              </a:r>
+              <a:r>
+                <a:rPr lang="tr-TR" sz="1400" b="0" strike="noStrike" spc="-1" dirty="0">
+                  <a:latin typeface="Lucida Sans" panose="020B0602030504020204" pitchFamily="34" charset="0"/>
+                </a:rPr>
+                <a:t> </a:t>
+              </a:r>
+              <a:r>
+                <a:rPr lang="en-US" sz="1400" b="0" strike="noStrike" spc="-1" dirty="0">
+                  <a:latin typeface="Lucida Sans" panose="020B0602030504020204" pitchFamily="34" charset="0"/>
+                </a:rPr>
+                <a:t> </a:t>
+              </a:r>
+              <a:r>
+                <a:rPr lang="tr-TR" sz="1400" b="0" strike="noStrike" spc="-1" dirty="0">
+                  <a:latin typeface="Lucida Sans" panose="020B0602030504020204" pitchFamily="34" charset="0"/>
+                </a:rPr>
+                <a:t>        </a:t>
+              </a:r>
+              <a:r>
+                <a:rPr lang="en-US" sz="1400" spc="-1" dirty="0">
+                  <a:latin typeface="Lucida Sans" panose="020B0602030504020204" pitchFamily="34" charset="0"/>
+                </a:rPr>
+                <a:t> </a:t>
+              </a:r>
+              <a:r>
+                <a:rPr lang="tr-TR" sz="1400" b="0" strike="noStrike" spc="-1" dirty="0">
+                  <a:latin typeface="Lucida Sans" panose="020B0602030504020204" pitchFamily="34" charset="0"/>
+                </a:rPr>
+                <a:t>           7  </a:t>
+              </a:r>
+              <a:r>
+                <a:rPr lang="en-US" sz="1400" b="0" strike="noStrike" spc="-1" dirty="0">
+                  <a:latin typeface="Lucida Sans" panose="020B0602030504020204" pitchFamily="34" charset="0"/>
+                </a:rPr>
+                <a:t>  </a:t>
+              </a:r>
+              <a:r>
+                <a:rPr lang="tr-TR" sz="1400" b="0" strike="noStrike" spc="-1" dirty="0">
+                  <a:latin typeface="Lucida Sans" panose="020B0602030504020204" pitchFamily="34" charset="0"/>
+                </a:rPr>
+                <a:t>      8</a:t>
+              </a:r>
+              <a:endParaRPr lang="en-US" sz="1400" b="0" strike="noStrike" spc="-1" dirty="0">
+                <a:latin typeface="Lucida Sans" panose="020B0602030504020204" pitchFamily="34" charset="0"/>
+              </a:endParaRPr>
+            </a:p>
+          </p:txBody>
+        </p:sp>
+        <p:cxnSp>
+          <p:nvCxnSpPr>
+            <p:cNvPr id="6" name="Straight Connector 5">
+              <a:extLst>
+                <a:ext uri="{FF2B5EF4-FFF2-40B4-BE49-F238E27FC236}">
+                  <a16:creationId xmlns:a16="http://schemas.microsoft.com/office/drawing/2014/main" id="{CABF84A6-7396-2DC5-E23C-02FBBB06721F}"/>
+                </a:ext>
+              </a:extLst>
+            </p:cNvPr>
+            <p:cNvCxnSpPr>
+              <a:cxnSpLocks/>
+            </p:cNvCxnSpPr>
+            <p:nvPr/>
+          </p:nvCxnSpPr>
+          <p:spPr>
+            <a:xfrm>
+              <a:off x="1943968" y="1971179"/>
+              <a:ext cx="720080" cy="0"/>
+            </a:xfrm>
+            <a:prstGeom prst="line">
+              <a:avLst/>
+            </a:prstGeom>
+            <a:ln w="76200">
+              <a:solidFill>
+                <a:schemeClr val="tx1"/>
+              </a:solidFill>
+            </a:ln>
+          </p:spPr>
+          <p:style>
+            <a:lnRef idx="1">
+              <a:schemeClr val="accent1"/>
+            </a:lnRef>
+            <a:fillRef idx="0">
+              <a:schemeClr val="accent1"/>
+            </a:fillRef>
+            <a:effectRef idx="0">
+              <a:schemeClr val="accent1"/>
+            </a:effectRef>
+            <a:fontRef idx="minor">
+              <a:schemeClr val="tx1"/>
+            </a:fontRef>
+          </p:style>
+        </p:cxnSp>
+        <p:cxnSp>
+          <p:nvCxnSpPr>
+            <p:cNvPr id="23" name="Straight Connector 22">
+              <a:extLst>
+                <a:ext uri="{FF2B5EF4-FFF2-40B4-BE49-F238E27FC236}">
+                  <a16:creationId xmlns:a16="http://schemas.microsoft.com/office/drawing/2014/main" id="{52EE8CEB-570E-CFA8-1218-4ED9CA81C64E}"/>
+                </a:ext>
+              </a:extLst>
+            </p:cNvPr>
+            <p:cNvCxnSpPr>
+              <a:cxnSpLocks/>
+            </p:cNvCxnSpPr>
+            <p:nvPr/>
+          </p:nvCxnSpPr>
+          <p:spPr>
+            <a:xfrm>
+              <a:off x="2248991" y="2187203"/>
+              <a:ext cx="720080" cy="0"/>
+            </a:xfrm>
+            <a:prstGeom prst="line">
+              <a:avLst/>
+            </a:prstGeom>
+            <a:ln w="76200">
+              <a:solidFill>
+                <a:schemeClr val="tx1"/>
+              </a:solidFill>
+            </a:ln>
+          </p:spPr>
+          <p:style>
+            <a:lnRef idx="1">
+              <a:schemeClr val="accent1"/>
+            </a:lnRef>
+            <a:fillRef idx="0">
+              <a:schemeClr val="accent1"/>
+            </a:fillRef>
+            <a:effectRef idx="0">
+              <a:schemeClr val="accent1"/>
+            </a:effectRef>
+            <a:fontRef idx="minor">
+              <a:schemeClr val="tx1"/>
+            </a:fontRef>
+          </p:style>
+        </p:cxnSp>
+        <p:cxnSp>
+          <p:nvCxnSpPr>
+            <p:cNvPr id="24" name="Straight Connector 23">
+              <a:extLst>
+                <a:ext uri="{FF2B5EF4-FFF2-40B4-BE49-F238E27FC236}">
+                  <a16:creationId xmlns:a16="http://schemas.microsoft.com/office/drawing/2014/main" id="{A9CE8769-216E-DFCC-0CF1-0E7693654564}"/>
+                </a:ext>
+              </a:extLst>
+            </p:cNvPr>
+            <p:cNvCxnSpPr>
+              <a:cxnSpLocks/>
+            </p:cNvCxnSpPr>
+            <p:nvPr/>
+          </p:nvCxnSpPr>
+          <p:spPr>
+            <a:xfrm>
+              <a:off x="2592040" y="2403227"/>
+              <a:ext cx="720080" cy="0"/>
+            </a:xfrm>
+            <a:prstGeom prst="line">
+              <a:avLst/>
+            </a:prstGeom>
+            <a:ln w="76200">
+              <a:solidFill>
+                <a:schemeClr val="tx1"/>
+              </a:solidFill>
+            </a:ln>
+          </p:spPr>
+          <p:style>
+            <a:lnRef idx="1">
+              <a:schemeClr val="accent1"/>
+            </a:lnRef>
+            <a:fillRef idx="0">
+              <a:schemeClr val="accent1"/>
+            </a:fillRef>
+            <a:effectRef idx="0">
+              <a:schemeClr val="accent1"/>
+            </a:effectRef>
+            <a:fontRef idx="minor">
+              <a:schemeClr val="tx1"/>
+            </a:fontRef>
+          </p:style>
+        </p:cxnSp>
+        <p:cxnSp>
+          <p:nvCxnSpPr>
+            <p:cNvPr id="25" name="Straight Connector 24">
+              <a:extLst>
+                <a:ext uri="{FF2B5EF4-FFF2-40B4-BE49-F238E27FC236}">
+                  <a16:creationId xmlns:a16="http://schemas.microsoft.com/office/drawing/2014/main" id="{88046C67-6511-CBCF-00F9-AFC7E8324142}"/>
+                </a:ext>
+              </a:extLst>
+            </p:cNvPr>
+            <p:cNvCxnSpPr>
+              <a:cxnSpLocks/>
+            </p:cNvCxnSpPr>
+            <p:nvPr/>
+          </p:nvCxnSpPr>
+          <p:spPr>
+            <a:xfrm>
+              <a:off x="2952080" y="2619251"/>
+              <a:ext cx="720080" cy="0"/>
+            </a:xfrm>
+            <a:prstGeom prst="line">
+              <a:avLst/>
+            </a:prstGeom>
+            <a:ln w="76200">
+              <a:solidFill>
+                <a:schemeClr val="tx1"/>
+              </a:solidFill>
+            </a:ln>
+          </p:spPr>
+          <p:style>
+            <a:lnRef idx="1">
+              <a:schemeClr val="accent1"/>
+            </a:lnRef>
+            <a:fillRef idx="0">
+              <a:schemeClr val="accent1"/>
+            </a:fillRef>
+            <a:effectRef idx="0">
+              <a:schemeClr val="accent1"/>
+            </a:effectRef>
+            <a:fontRef idx="minor">
+              <a:schemeClr val="tx1"/>
+            </a:fontRef>
+          </p:style>
+        </p:cxnSp>
+        <p:cxnSp>
+          <p:nvCxnSpPr>
+            <p:cNvPr id="28" name="Straight Connector 27">
+              <a:extLst>
+                <a:ext uri="{FF2B5EF4-FFF2-40B4-BE49-F238E27FC236}">
+                  <a16:creationId xmlns:a16="http://schemas.microsoft.com/office/drawing/2014/main" id="{7CEE19D6-3874-2CB0-4E4A-BEFB0E8C3084}"/>
+                </a:ext>
+              </a:extLst>
+            </p:cNvPr>
+            <p:cNvCxnSpPr>
+              <a:cxnSpLocks/>
+            </p:cNvCxnSpPr>
+            <p:nvPr/>
+          </p:nvCxnSpPr>
+          <p:spPr>
+            <a:xfrm>
+              <a:off x="4032200" y="1683147"/>
+              <a:ext cx="0" cy="1080120"/>
+            </a:xfrm>
+            <a:prstGeom prst="line">
+              <a:avLst/>
+            </a:prstGeom>
+            <a:ln w="28575">
+              <a:solidFill>
+                <a:schemeClr val="bg1">
+                  <a:lumMod val="75000"/>
+                </a:schemeClr>
+              </a:solidFill>
+              <a:prstDash val="sysDot"/>
+            </a:ln>
+          </p:spPr>
+          <p:style>
+            <a:lnRef idx="1">
+              <a:schemeClr val="accent1"/>
+            </a:lnRef>
+            <a:fillRef idx="0">
+              <a:schemeClr val="accent1"/>
+            </a:fillRef>
+            <a:effectRef idx="0">
+              <a:schemeClr val="accent1"/>
+            </a:effectRef>
+            <a:fontRef idx="minor">
+              <a:schemeClr val="tx1"/>
+            </a:fontRef>
+          </p:style>
+        </p:cxnSp>
+        <p:cxnSp>
+          <p:nvCxnSpPr>
+            <p:cNvPr id="30" name="Straight Connector 29">
+              <a:extLst>
+                <a:ext uri="{FF2B5EF4-FFF2-40B4-BE49-F238E27FC236}">
+                  <a16:creationId xmlns:a16="http://schemas.microsoft.com/office/drawing/2014/main" id="{D2AB8C33-9180-DE02-7A19-AE570B3A9935}"/>
+                </a:ext>
+              </a:extLst>
+            </p:cNvPr>
+            <p:cNvCxnSpPr>
+              <a:cxnSpLocks/>
+            </p:cNvCxnSpPr>
+            <p:nvPr/>
+          </p:nvCxnSpPr>
+          <p:spPr>
+            <a:xfrm>
+              <a:off x="1943968" y="1683147"/>
+              <a:ext cx="0" cy="1080120"/>
+            </a:xfrm>
+            <a:prstGeom prst="line">
+              <a:avLst/>
+            </a:prstGeom>
+            <a:ln w="28575">
+              <a:solidFill>
+                <a:schemeClr val="bg1">
+                  <a:lumMod val="75000"/>
+                </a:schemeClr>
+              </a:solidFill>
+              <a:prstDash val="sysDot"/>
+            </a:ln>
+          </p:spPr>
+          <p:style>
+            <a:lnRef idx="1">
+              <a:schemeClr val="accent1"/>
+            </a:lnRef>
+            <a:fillRef idx="0">
+              <a:schemeClr val="accent1"/>
+            </a:fillRef>
+            <a:effectRef idx="0">
+              <a:schemeClr val="accent1"/>
+            </a:effectRef>
+            <a:fontRef idx="minor">
+              <a:schemeClr val="tx1"/>
+            </a:fontRef>
+          </p:style>
+        </p:cxnSp>
+      </p:grpSp>
+      <p:sp>
+        <p:nvSpPr>
+          <p:cNvPr id="39" name="TextShape 4">
+            <a:extLst>
+              <a:ext uri="{FF2B5EF4-FFF2-40B4-BE49-F238E27FC236}">
+                <a16:creationId xmlns:a16="http://schemas.microsoft.com/office/drawing/2014/main" id="{06F125CF-990A-BDE3-D547-215E87A40153}"/>
+              </a:ext>
+            </a:extLst>
+          </p:cNvPr>
+          <p:cNvSpPr txBox="1"/>
+          <p:nvPr/>
+        </p:nvSpPr>
+        <p:spPr>
+          <a:xfrm>
+            <a:off x="1583929" y="1817575"/>
+            <a:ext cx="405570" cy="229769"/>
+          </a:xfrm>
+          <a:prstGeom prst="rect">
+            <a:avLst/>
+          </a:prstGeom>
+          <a:noFill/>
+          <a:ln>
+            <a:noFill/>
+          </a:ln>
+        </p:spPr>
+        <p:txBody>
+          <a:bodyPr lIns="90000" tIns="45000" rIns="90000" bIns="45000"/>
+          <a:lstStyle/>
+          <a:p>
+            <a:r>
+              <a:rPr lang="en-US" sz="1200" spc="-1" dirty="0">
+                <a:latin typeface="Lucida Sans" panose="020B0602030504020204" pitchFamily="34" charset="0"/>
+              </a:rPr>
+              <a:t>(</a:t>
+            </a:r>
+            <a:r>
+              <a:rPr lang="tr-TR" sz="1200" b="0" strike="noStrike" spc="-1" dirty="0">
+                <a:latin typeface="Lucida Sans" panose="020B0602030504020204" pitchFamily="34" charset="0"/>
+              </a:rPr>
+              <a:t>1</a:t>
+            </a:r>
+            <a:r>
+              <a:rPr lang="en-US" sz="1200" spc="-1" dirty="0">
+                <a:latin typeface="Lucida Sans" panose="020B0602030504020204" pitchFamily="34" charset="0"/>
+              </a:rPr>
+              <a:t>)</a:t>
+            </a:r>
+            <a:endParaRPr lang="en-US" sz="1200" b="0" strike="noStrike" spc="-1" dirty="0">
+              <a:latin typeface="Lucida Sans" panose="020B0602030504020204" pitchFamily="34" charset="0"/>
+            </a:endParaRPr>
+          </a:p>
+        </p:txBody>
+      </p:sp>
+      <p:sp>
+        <p:nvSpPr>
+          <p:cNvPr id="40" name="TextShape 4">
+            <a:extLst>
+              <a:ext uri="{FF2B5EF4-FFF2-40B4-BE49-F238E27FC236}">
+                <a16:creationId xmlns:a16="http://schemas.microsoft.com/office/drawing/2014/main" id="{0D83EAE9-C406-0CDB-4A2E-048C1FCA5A5F}"/>
+              </a:ext>
+            </a:extLst>
+          </p:cNvPr>
+          <p:cNvSpPr txBox="1"/>
+          <p:nvPr/>
+        </p:nvSpPr>
+        <p:spPr>
+          <a:xfrm>
+            <a:off x="1921203" y="2047298"/>
+            <a:ext cx="405570" cy="229769"/>
+          </a:xfrm>
+          <a:prstGeom prst="rect">
+            <a:avLst/>
+          </a:prstGeom>
+          <a:noFill/>
+          <a:ln>
+            <a:noFill/>
+          </a:ln>
+        </p:spPr>
+        <p:txBody>
+          <a:bodyPr lIns="90000" tIns="45000" rIns="90000" bIns="45000"/>
+          <a:lstStyle/>
+          <a:p>
+            <a:r>
+              <a:rPr lang="en-US" sz="1200" spc="-1" dirty="0">
+                <a:latin typeface="Lucida Sans" panose="020B0602030504020204" pitchFamily="34" charset="0"/>
+              </a:rPr>
+              <a:t>(</a:t>
+            </a:r>
+            <a:r>
+              <a:rPr lang="en-US" sz="1200" b="0" strike="noStrike" spc="-1" dirty="0">
+                <a:latin typeface="Lucida Sans" panose="020B0602030504020204" pitchFamily="34" charset="0"/>
+              </a:rPr>
+              <a:t>2</a:t>
+            </a:r>
+            <a:r>
+              <a:rPr lang="en-US" sz="1200" spc="-1" dirty="0">
+                <a:latin typeface="Lucida Sans" panose="020B0602030504020204" pitchFamily="34" charset="0"/>
+              </a:rPr>
+              <a:t>)</a:t>
+            </a:r>
+            <a:endParaRPr lang="en-US" sz="1200" b="0" strike="noStrike" spc="-1" dirty="0">
+              <a:latin typeface="Lucida Sans" panose="020B0602030504020204" pitchFamily="34" charset="0"/>
+            </a:endParaRPr>
+          </a:p>
+        </p:txBody>
+      </p:sp>
+      <p:sp>
+        <p:nvSpPr>
+          <p:cNvPr id="44" name="TextShape 4">
+            <a:extLst>
+              <a:ext uri="{FF2B5EF4-FFF2-40B4-BE49-F238E27FC236}">
+                <a16:creationId xmlns:a16="http://schemas.microsoft.com/office/drawing/2014/main" id="{7F15C9AE-5BAA-D042-462F-754264FFAB7A}"/>
+              </a:ext>
+            </a:extLst>
+          </p:cNvPr>
+          <p:cNvSpPr txBox="1"/>
+          <p:nvPr/>
+        </p:nvSpPr>
+        <p:spPr>
+          <a:xfrm>
+            <a:off x="2245239" y="2263321"/>
+            <a:ext cx="405570" cy="229769"/>
+          </a:xfrm>
+          <a:prstGeom prst="rect">
+            <a:avLst/>
+          </a:prstGeom>
+          <a:noFill/>
+          <a:ln>
+            <a:noFill/>
+          </a:ln>
+        </p:spPr>
+        <p:txBody>
+          <a:bodyPr lIns="90000" tIns="45000" rIns="90000" bIns="45000"/>
+          <a:lstStyle/>
+          <a:p>
+            <a:r>
+              <a:rPr lang="en-US" sz="1200" spc="-1" dirty="0">
+                <a:latin typeface="Lucida Sans" panose="020B0602030504020204" pitchFamily="34" charset="0"/>
+              </a:rPr>
+              <a:t>(</a:t>
+            </a:r>
+            <a:r>
+              <a:rPr lang="en-US" sz="1200" b="0" strike="noStrike" spc="-1" dirty="0">
+                <a:latin typeface="Lucida Sans" panose="020B0602030504020204" pitchFamily="34" charset="0"/>
+              </a:rPr>
+              <a:t>3</a:t>
+            </a:r>
+            <a:r>
+              <a:rPr lang="en-US" sz="1200" spc="-1" dirty="0">
+                <a:latin typeface="Lucida Sans" panose="020B0602030504020204" pitchFamily="34" charset="0"/>
+              </a:rPr>
+              <a:t>)</a:t>
+            </a:r>
+            <a:endParaRPr lang="en-US" sz="1200" b="0" strike="noStrike" spc="-1" dirty="0">
+              <a:latin typeface="Lucida Sans" panose="020B0602030504020204" pitchFamily="34" charset="0"/>
+            </a:endParaRPr>
+          </a:p>
+        </p:txBody>
+      </p:sp>
+      <p:sp>
+        <p:nvSpPr>
+          <p:cNvPr id="45" name="TextShape 4">
+            <a:extLst>
+              <a:ext uri="{FF2B5EF4-FFF2-40B4-BE49-F238E27FC236}">
+                <a16:creationId xmlns:a16="http://schemas.microsoft.com/office/drawing/2014/main" id="{B6CBF203-2211-C0EB-BBE8-C9554D610F15}"/>
+              </a:ext>
+            </a:extLst>
+          </p:cNvPr>
+          <p:cNvSpPr txBox="1"/>
+          <p:nvPr/>
+        </p:nvSpPr>
+        <p:spPr>
+          <a:xfrm>
+            <a:off x="2616662" y="2479344"/>
+            <a:ext cx="405570" cy="229769"/>
+          </a:xfrm>
+          <a:prstGeom prst="rect">
+            <a:avLst/>
+          </a:prstGeom>
+          <a:noFill/>
+          <a:ln>
+            <a:noFill/>
+          </a:ln>
+        </p:spPr>
+        <p:txBody>
+          <a:bodyPr lIns="90000" tIns="45000" rIns="90000" bIns="45000"/>
+          <a:lstStyle/>
+          <a:p>
+            <a:r>
+              <a:rPr lang="en-US" sz="1200" spc="-1" dirty="0">
+                <a:latin typeface="Lucida Sans" panose="020B0602030504020204" pitchFamily="34" charset="0"/>
+              </a:rPr>
+              <a:t>(</a:t>
+            </a:r>
+            <a:r>
+              <a:rPr lang="en-US" sz="1200" b="0" strike="noStrike" spc="-1" dirty="0">
+                <a:latin typeface="Lucida Sans" panose="020B0602030504020204" pitchFamily="34" charset="0"/>
+              </a:rPr>
+              <a:t>4</a:t>
+            </a:r>
+            <a:r>
+              <a:rPr lang="en-US" sz="1200" spc="-1" dirty="0">
+                <a:latin typeface="Lucida Sans" panose="020B0602030504020204" pitchFamily="34" charset="0"/>
+              </a:rPr>
+              <a:t>)</a:t>
+            </a:r>
+            <a:endParaRPr lang="en-US" sz="1200" b="0" strike="noStrike" spc="-1" dirty="0">
+              <a:latin typeface="Lucida Sans" panose="020B0602030504020204" pitchFamily="34" charset="0"/>
+            </a:endParaRPr>
+          </a:p>
+        </p:txBody>
+      </p:sp>
+    </p:spTree>
+    <p:extLst>
+      <p:ext uri="{BB962C8B-B14F-4D97-AF65-F5344CB8AC3E}">
+        <p14:creationId xmlns:p14="http://schemas.microsoft.com/office/powerpoint/2010/main" val="792384706"/>
+      </p:ext>
+    </p:extLst>
+  </p:cSld>
+  <p:clrMapOvr>
+    <a:masterClrMapping/>
+  </p:clrMapOvr>
+  <p:timing>
+    <p:tnLst>
+      <p:par>
+        <p:cTn id="1" dur="indefinite" restart="never" nodeType="tmRoot">
+          <p:childTnLst>
+            <p:seq>
+              <p:cTn id="2" dur="indefinite" nodeType="mainSeq"/>
+              <p:prevCondLst>
+                <p:cond evt="onPrev" delay="0">
+                  <p:tgtEl>
+                    <p:sldTgt/>
+                  </p:tgtEl>
+                </p:cond>
+              </p:prevCondLst>
+              <p:nextCondLst>
+                <p:cond evt="onNext" delay="0">
+                  <p:tgtEl>
+                    <p:sldTgt/>
+                  </p:tgtEl>
+                </p:cond>
+              </p:nextCondLst>
+            </p:seq>
+          </p:childTnLst>
+        </p:cTn>
+      </p:par>
+    </p:tnLst>
+  </p:timing>
+</p:sld>
+</file>
+
+<file path=ppt/slides/slide8.xml><?xml version="1.0" encoding="utf-8"?>
 <p:sld xmlns:a="http://schemas.openxmlformats.org/drawingml/2006/main" xmlns:r="http://schemas.openxmlformats.org/officeDocument/2006/relationships" xmlns:p="http://schemas.openxmlformats.org/presentationml/2006/main">
   <p:cSld>
     <p:spTree>
@@ -17932,7 +19644,7 @@
 </p:sld>
 </file>
 
-<file path=ppt/slides/slide8.xml><?xml version="1.0" encoding="utf-8"?>
+<file path=ppt/slides/slide9.xml><?xml version="1.0" encoding="utf-8"?>
 <p:sld xmlns:a="http://schemas.openxmlformats.org/drawingml/2006/main" xmlns:r="http://schemas.openxmlformats.org/officeDocument/2006/relationships" xmlns:p="http://schemas.openxmlformats.org/presentationml/2006/main">
   <p:cSld>
     <p:spTree>

</xml_diff>